<commit_message>
- lecture 10.2, 11.3
</commit_message>
<xml_diff>
--- a/lectures/week10/lecture2/slides/week10_lecture2.pptx
+++ b/lectures/week10/lecture2/slides/week10_lecture2.pptx
@@ -11287,7 +11287,7 @@
             <a:pPr lvl="1"/>
             <a:r>
               <a:rPr lang="en-US" dirty="0"/>
-              <a:t>More Containers and Advanced Functions</a:t>
+              <a:t>Cancelled</a:t>
             </a:r>
           </a:p>
           <a:p>
@@ -14840,7 +14840,7 @@
         <p:spPr>
           <a:xfrm>
             <a:off x="3557728" y="3889320"/>
-            <a:ext cx="4185761" cy="1938992"/>
+            <a:ext cx="4031873" cy="2246769"/>
           </a:xfrm>
           <a:prstGeom prst="rect">
             <a:avLst/>
@@ -14871,31 +14871,43 @@
                 <a:latin typeface="Courier New" panose="02070309020205020404" pitchFamily="49" charset="0"/>
                 <a:cs typeface="Courier New" panose="02070309020205020404" pitchFamily="49" charset="0"/>
               </a:rPr>
-              <a:t> = Person(‘June’, 34, </a:t>
-            </a:r>
-          </a:p>
-          <a:p>
-            <a:r>
-              <a:rPr lang="en-US" sz="2000" b="1" dirty="0">
-                <a:solidFill>
-                  <a:srgbClr val="00FF00"/>
-                </a:solidFill>
-                <a:latin typeface="Courier New" panose="02070309020205020404" pitchFamily="49" charset="0"/>
-                <a:cs typeface="Courier New" panose="02070309020205020404" pitchFamily="49" charset="0"/>
-              </a:rPr>
-              <a:t>              ‘Ottawa’, </a:t>
-            </a:r>
-          </a:p>
-          <a:p>
-            <a:r>
-              <a:rPr lang="en-US" sz="2000" b="1" dirty="0">
-                <a:solidFill>
-                  <a:srgbClr val="00FF00"/>
-                </a:solidFill>
-                <a:latin typeface="Courier New" panose="02070309020205020404" pitchFamily="49" charset="0"/>
-                <a:cs typeface="Courier New" panose="02070309020205020404" pitchFamily="49" charset="0"/>
-              </a:rPr>
-              <a:t>              ‘she/her’)</a:t>
+              <a:t> = Person(‘Sam’, 19, </a:t>
+            </a:r>
+          </a:p>
+          <a:p>
+            <a:r>
+              <a:rPr lang="en-US" sz="2000" b="1" dirty="0">
+                <a:solidFill>
+                  <a:srgbClr val="00FF00"/>
+                </a:solidFill>
+                <a:latin typeface="Courier New" panose="02070309020205020404" pitchFamily="49" charset="0"/>
+                <a:cs typeface="Courier New" panose="02070309020205020404" pitchFamily="49" charset="0"/>
+              </a:rPr>
+              <a:t>              [‘APS106’,</a:t>
+            </a:r>
+          </a:p>
+          <a:p>
+            <a:r>
+              <a:rPr lang="en-US" sz="2000" b="1" dirty="0">
+                <a:solidFill>
+                  <a:srgbClr val="00FF00"/>
+                </a:solidFill>
+                <a:latin typeface="Courier New" panose="02070309020205020404" pitchFamily="49" charset="0"/>
+                <a:cs typeface="Courier New" panose="02070309020205020404" pitchFamily="49" charset="0"/>
+              </a:rPr>
+              <a:t>               ‘CIV100’,</a:t>
+            </a:r>
+          </a:p>
+          <a:p>
+            <a:r>
+              <a:rPr lang="en-US" sz="2000" b="1" dirty="0">
+                <a:solidFill>
+                  <a:srgbClr val="00FF00"/>
+                </a:solidFill>
+                <a:latin typeface="Courier New" panose="02070309020205020404" pitchFamily="49" charset="0"/>
+                <a:cs typeface="Courier New" panose="02070309020205020404" pitchFamily="49" charset="0"/>
+              </a:rPr>
+              <a:t>               ‘MIE100’])</a:t>
             </a:r>
           </a:p>
           <a:p>

</xml_diff>